<commit_message>
no demo no shift sim.
</commit_message>
<xml_diff>
--- a/2020_08_25_dog_dfe_meeting.pptx
+++ b/2020_08_25_dog_dfe_meeting.pptx
@@ -6,12 +6,15 @@
   </p:sldMasterIdLst>
   <p:sldIdLst>
     <p:sldId id="256" r:id="rId2"/>
-    <p:sldId id="320" r:id="rId3"/>
-    <p:sldId id="334" r:id="rId4"/>
-    <p:sldId id="335" r:id="rId5"/>
-    <p:sldId id="331" r:id="rId6"/>
-    <p:sldId id="326" r:id="rId7"/>
-    <p:sldId id="333" r:id="rId8"/>
+    <p:sldId id="336" r:id="rId3"/>
+    <p:sldId id="337" r:id="rId4"/>
+    <p:sldId id="339" r:id="rId5"/>
+    <p:sldId id="338" r:id="rId6"/>
+    <p:sldId id="341" r:id="rId7"/>
+    <p:sldId id="331" r:id="rId8"/>
+    <p:sldId id="326" r:id="rId9"/>
+    <p:sldId id="333" r:id="rId10"/>
+    <p:sldId id="340" r:id="rId11"/>
   </p:sldIdLst>
   <p:sldSz cx="12192000" cy="6858000"/>
   <p:notesSz cx="6858000" cy="9144000"/>
@@ -265,7 +268,7 @@
           <a:p>
             <a:fld id="{57DDFF62-7ABC-43A0-9D83-5FC5F205A8C4}" type="datetimeFigureOut">
               <a:rPr lang="en-US" smtClean="0"/>
-              <a:t>8/25/2020</a:t>
+              <a:t>9/8/2020</a:t>
             </a:fld>
             <a:endParaRPr lang="en-US"/>
           </a:p>
@@ -463,7 +466,7 @@
           <a:p>
             <a:fld id="{57DDFF62-7ABC-43A0-9D83-5FC5F205A8C4}" type="datetimeFigureOut">
               <a:rPr lang="en-US" smtClean="0"/>
-              <a:t>8/25/2020</a:t>
+              <a:t>9/8/2020</a:t>
             </a:fld>
             <a:endParaRPr lang="en-US"/>
           </a:p>
@@ -671,7 +674,7 @@
           <a:p>
             <a:fld id="{57DDFF62-7ABC-43A0-9D83-5FC5F205A8C4}" type="datetimeFigureOut">
               <a:rPr lang="en-US" smtClean="0"/>
-              <a:t>8/25/2020</a:t>
+              <a:t>9/8/2020</a:t>
             </a:fld>
             <a:endParaRPr lang="en-US"/>
           </a:p>
@@ -869,7 +872,7 @@
           <a:p>
             <a:fld id="{57DDFF62-7ABC-43A0-9D83-5FC5F205A8C4}" type="datetimeFigureOut">
               <a:rPr lang="en-US" smtClean="0"/>
-              <a:t>8/25/2020</a:t>
+              <a:t>9/8/2020</a:t>
             </a:fld>
             <a:endParaRPr lang="en-US"/>
           </a:p>
@@ -1144,7 +1147,7 @@
           <a:p>
             <a:fld id="{57DDFF62-7ABC-43A0-9D83-5FC5F205A8C4}" type="datetimeFigureOut">
               <a:rPr lang="en-US" smtClean="0"/>
-              <a:t>8/25/2020</a:t>
+              <a:t>9/8/2020</a:t>
             </a:fld>
             <a:endParaRPr lang="en-US"/>
           </a:p>
@@ -1409,7 +1412,7 @@
           <a:p>
             <a:fld id="{57DDFF62-7ABC-43A0-9D83-5FC5F205A8C4}" type="datetimeFigureOut">
               <a:rPr lang="en-US" smtClean="0"/>
-              <a:t>8/25/2020</a:t>
+              <a:t>9/8/2020</a:t>
             </a:fld>
             <a:endParaRPr lang="en-US"/>
           </a:p>
@@ -1821,7 +1824,7 @@
           <a:p>
             <a:fld id="{57DDFF62-7ABC-43A0-9D83-5FC5F205A8C4}" type="datetimeFigureOut">
               <a:rPr lang="en-US" smtClean="0"/>
-              <a:t>8/25/2020</a:t>
+              <a:t>9/8/2020</a:t>
             </a:fld>
             <a:endParaRPr lang="en-US"/>
           </a:p>
@@ -1962,7 +1965,7 @@
           <a:p>
             <a:fld id="{57DDFF62-7ABC-43A0-9D83-5FC5F205A8C4}" type="datetimeFigureOut">
               <a:rPr lang="en-US" smtClean="0"/>
-              <a:t>8/25/2020</a:t>
+              <a:t>9/8/2020</a:t>
             </a:fld>
             <a:endParaRPr lang="en-US"/>
           </a:p>
@@ -2075,7 +2078,7 @@
           <a:p>
             <a:fld id="{57DDFF62-7ABC-43A0-9D83-5FC5F205A8C4}" type="datetimeFigureOut">
               <a:rPr lang="en-US" smtClean="0"/>
-              <a:t>8/25/2020</a:t>
+              <a:t>9/8/2020</a:t>
             </a:fld>
             <a:endParaRPr lang="en-US"/>
           </a:p>
@@ -2386,7 +2389,7 @@
           <a:p>
             <a:fld id="{57DDFF62-7ABC-43A0-9D83-5FC5F205A8C4}" type="datetimeFigureOut">
               <a:rPr lang="en-US" smtClean="0"/>
-              <a:t>8/25/2020</a:t>
+              <a:t>9/8/2020</a:t>
             </a:fld>
             <a:endParaRPr lang="en-US"/>
           </a:p>
@@ -2674,7 +2677,7 @@
           <a:p>
             <a:fld id="{57DDFF62-7ABC-43A0-9D83-5FC5F205A8C4}" type="datetimeFigureOut">
               <a:rPr lang="en-US" smtClean="0"/>
-              <a:t>8/25/2020</a:t>
+              <a:t>9/8/2020</a:t>
             </a:fld>
             <a:endParaRPr lang="en-US"/>
           </a:p>
@@ -2915,7 +2918,7 @@
           <a:p>
             <a:fld id="{57DDFF62-7ABC-43A0-9D83-5FC5F205A8C4}" type="datetimeFigureOut">
               <a:rPr lang="en-US" smtClean="0"/>
-              <a:t>8/25/2020</a:t>
+              <a:t>9/8/2020</a:t>
             </a:fld>
             <a:endParaRPr lang="en-US"/>
           </a:p>
@@ -3401,6 +3404,150 @@
 </p:sld>
 </file>
 
+<file path=ppt/slides/slide10.xml><?xml version="1.0" encoding="utf-8"?>
+<p:sld xmlns:a="http://schemas.openxmlformats.org/drawingml/2006/main" xmlns:r="http://schemas.openxmlformats.org/officeDocument/2006/relationships" xmlns:p="http://schemas.openxmlformats.org/presentationml/2006/main">
+  <p:cSld>
+    <p:spTree>
+      <p:nvGrpSpPr>
+        <p:cNvPr id="1" name=""/>
+        <p:cNvGrpSpPr/>
+        <p:nvPr/>
+      </p:nvGrpSpPr>
+      <p:grpSpPr>
+        <a:xfrm>
+          <a:off x="0" y="0"/>
+          <a:ext cx="0" cy="0"/>
+          <a:chOff x="0" y="0"/>
+          <a:chExt cx="0" cy="0"/>
+        </a:xfrm>
+      </p:grpSpPr>
+      <p:sp>
+        <p:nvSpPr>
+          <p:cNvPr id="2" name="Title 1">
+            <a:extLst>
+              <a:ext uri="{FF2B5EF4-FFF2-40B4-BE49-F238E27FC236}">
+                <a16:creationId xmlns:a16="http://schemas.microsoft.com/office/drawing/2014/main" id="{8A2AF629-D9F6-4D69-901F-8B5CAEB2FF16}"/>
+              </a:ext>
+            </a:extLst>
+          </p:cNvPr>
+          <p:cNvSpPr>
+            <a:spLocks noGrp="1"/>
+          </p:cNvSpPr>
+          <p:nvPr>
+            <p:ph type="title"/>
+          </p:nvPr>
+        </p:nvSpPr>
+        <p:spPr/>
+        <p:txBody>
+          <a:bodyPr/>
+          <a:lstStyle/>
+          <a:p>
+            <a:r>
+              <a:rPr lang="en-US" dirty="0"/>
+              <a:t>//TODO	</a:t>
+            </a:r>
+          </a:p>
+        </p:txBody>
+      </p:sp>
+      <p:sp>
+        <p:nvSpPr>
+          <p:cNvPr id="3" name="Content Placeholder 2">
+            <a:extLst>
+              <a:ext uri="{FF2B5EF4-FFF2-40B4-BE49-F238E27FC236}">
+                <a16:creationId xmlns:a16="http://schemas.microsoft.com/office/drawing/2014/main" id="{736BF7A5-CFA1-4855-83FC-D83B12433C45}"/>
+              </a:ext>
+            </a:extLst>
+          </p:cNvPr>
+          <p:cNvSpPr>
+            <a:spLocks noGrp="1"/>
+          </p:cNvSpPr>
+          <p:nvPr>
+            <p:ph idx="1"/>
+          </p:nvPr>
+        </p:nvSpPr>
+        <p:spPr/>
+        <p:txBody>
+          <a:bodyPr/>
+          <a:lstStyle/>
+          <a:p>
+            <a:r>
+              <a:rPr lang="en-US" dirty="0"/>
+              <a:t>Simulation without demographic change or DFE shift (under a AW DFE)</a:t>
+            </a:r>
+          </a:p>
+          <a:p>
+            <a:r>
+              <a:rPr lang="en-US" dirty="0"/>
+              <a:t>Run 350 generations through </a:t>
+            </a:r>
+            <a:r>
+              <a:rPr lang="en-US" dirty="0" err="1"/>
+              <a:t>fitdadi</a:t>
+            </a:r>
+            <a:r>
+              <a:rPr lang="en-US" dirty="0"/>
+              <a:t> (for all of these)</a:t>
+            </a:r>
+          </a:p>
+          <a:p>
+            <a:pPr lvl="1"/>
+            <a:r>
+              <a:rPr lang="en-US" dirty="0"/>
+              <a:t>Fit Demographic Model to synonymous </a:t>
+            </a:r>
+            <a:r>
+              <a:rPr lang="en-US" dirty="0" err="1"/>
+              <a:t>sfs</a:t>
+            </a:r>
+            <a:endParaRPr lang="en-US" dirty="0"/>
+          </a:p>
+          <a:p>
+            <a:pPr lvl="1"/>
+            <a:r>
+              <a:rPr lang="en-US" dirty="0"/>
+              <a:t>Infer DFE</a:t>
+            </a:r>
+          </a:p>
+          <a:p>
+            <a:r>
+              <a:rPr lang="en-US" dirty="0"/>
+              <a:t>Look at simulations with and without DFE shift</a:t>
+            </a:r>
+          </a:p>
+          <a:p>
+            <a:pPr lvl="1"/>
+            <a:r>
+              <a:rPr lang="en-US" dirty="0"/>
+              <a:t>(Recap and Shift to Neutral)</a:t>
+            </a:r>
+          </a:p>
+          <a:p>
+            <a:r>
+              <a:rPr lang="en-US" dirty="0"/>
+              <a:t>Consider large size simulation without demographic contraction</a:t>
+            </a:r>
+          </a:p>
+          <a:p>
+            <a:r>
+              <a:rPr lang="en-US" dirty="0"/>
+              <a:t>SFS from large size simulation (recap and shift)</a:t>
+            </a:r>
+          </a:p>
+        </p:txBody>
+      </p:sp>
+    </p:spTree>
+    <p:extLst>
+      <p:ext uri="{BB962C8B-B14F-4D97-AF65-F5344CB8AC3E}">
+        <p14:creationId xmlns:p14="http://schemas.microsoft.com/office/powerpoint/2010/main" val="1325085072"/>
+      </p:ext>
+    </p:extLst>
+  </p:cSld>
+  <p:clrMapOvr>
+    <a:masterClrMapping/>
+  </p:clrMapOvr>
+</p:sld>
+</file>
+
 <file path=ppt/slides/slide2.xml><?xml version="1.0" encoding="utf-8"?>
 <p:sld xmlns:a="http://schemas.openxmlformats.org/drawingml/2006/main" xmlns:r="http://schemas.openxmlformats.org/officeDocument/2006/relationships" xmlns:p="http://schemas.openxmlformats.org/presentationml/2006/main">
   <p:cSld>
@@ -3423,7 +3570,7 @@
           <p:cNvPr id="2" name="Title 1">
             <a:extLst>
               <a:ext uri="{FF2B5EF4-FFF2-40B4-BE49-F238E27FC236}">
-                <a16:creationId xmlns:a16="http://schemas.microsoft.com/office/drawing/2014/main" id="{124AC836-54D4-4D0E-B44C-3B9CD54C79A7}"/>
+                <a16:creationId xmlns:a16="http://schemas.microsoft.com/office/drawing/2014/main" id="{1E8DD729-1B87-45F5-9C9B-13B1DA83BB80}"/>
               </a:ext>
             </a:extLst>
           </p:cNvPr>
@@ -3441,7 +3588,7 @@
           <a:p>
             <a:r>
               <a:rPr lang="en-US" dirty="0"/>
-              <a:t>Summary from 2 weeks ago</a:t>
+              <a:t>Recap from last week</a:t>
             </a:r>
           </a:p>
         </p:txBody>
@@ -3451,7 +3598,7 @@
           <p:cNvPr id="3" name="Content Placeholder 2">
             <a:extLst>
               <a:ext uri="{FF2B5EF4-FFF2-40B4-BE49-F238E27FC236}">
-                <a16:creationId xmlns:a16="http://schemas.microsoft.com/office/drawing/2014/main" id="{B9C2B77A-0659-41AA-BF0A-01EC46826368}"/>
+                <a16:creationId xmlns:a16="http://schemas.microsoft.com/office/drawing/2014/main" id="{3B1F5716-2CEC-4D99-8426-DE264FB900E3}"/>
               </a:ext>
             </a:extLst>
           </p:cNvPr>
@@ -3462,71 +3609,126 @@
             <p:ph idx="1"/>
           </p:nvPr>
         </p:nvSpPr>
+        <p:spPr/>
+        <p:txBody>
+          <a:bodyPr>
+            <a:normAutofit fontScale="85000" lnSpcReduction="20000"/>
+          </a:bodyPr>
+          <a:lstStyle/>
+          <a:p>
+            <a:endParaRPr lang="en-US" dirty="0"/>
+          </a:p>
+          <a:p>
+            <a:endParaRPr lang="en-US" dirty="0"/>
+          </a:p>
+          <a:p>
+            <a:endParaRPr lang="en-US" dirty="0"/>
+          </a:p>
+          <a:p>
+            <a:endParaRPr lang="en-US" dirty="0"/>
+          </a:p>
+          <a:p>
+            <a:endParaRPr lang="en-US" dirty="0"/>
+          </a:p>
+          <a:p>
+            <a:endParaRPr lang="en-US" dirty="0"/>
+          </a:p>
+          <a:p>
+            <a:endParaRPr lang="en-US" dirty="0"/>
+          </a:p>
+          <a:p>
+            <a:endParaRPr lang="en-US" dirty="0"/>
+          </a:p>
+          <a:p>
+            <a:r>
+              <a:rPr lang="en-US" dirty="0"/>
+              <a:t>Simulating a neutral simulation results in no significant difference between the proportional SYN and NS SFS.</a:t>
+            </a:r>
+          </a:p>
+          <a:p>
+            <a:r>
+              <a:rPr lang="en-US" dirty="0"/>
+              <a:t>Recapitulating the Arctic Wolf DFE results in the same SFS as shifting from Arctic Wolf to Arctic Wolf, i.e., not changing the DFE is consistent.</a:t>
+            </a:r>
+          </a:p>
+        </p:txBody>
+      </p:sp>
+      <p:pic>
+        <p:nvPicPr>
+          <p:cNvPr id="4" name="Content Placeholder 4" descr="A close up of a map&#10;&#10;Description automatically generated">
+            <a:extLst>
+              <a:ext uri="{FF2B5EF4-FFF2-40B4-BE49-F238E27FC236}">
+                <a16:creationId xmlns:a16="http://schemas.microsoft.com/office/drawing/2014/main" id="{6D0A5C31-A4AB-42DA-A48F-D41FE7FD150F}"/>
+              </a:ext>
+            </a:extLst>
+          </p:cNvPr>
+          <p:cNvPicPr>
+            <a:picLocks noChangeAspect="1"/>
+          </p:cNvPicPr>
+          <p:nvPr/>
+        </p:nvPicPr>
+        <p:blipFill>
+          <a:blip r:embed="rId2">
+            <a:extLst>
+              <a:ext uri="{28A0092B-C50C-407E-A947-70E740481C1C}">
+                <a14:useLocalDpi xmlns:a14="http://schemas.microsoft.com/office/drawing/2010/main" val="0"/>
+              </a:ext>
+            </a:extLst>
+          </a:blip>
+          <a:stretch>
+            <a:fillRect/>
+          </a:stretch>
+        </p:blipFill>
         <p:spPr>
           <a:xfrm>
-            <a:off x="838200" y="1481495"/>
-            <a:ext cx="10515600" cy="4870143"/>
+            <a:off x="6547635" y="1343505"/>
+            <a:ext cx="4806165" cy="3386994"/>
           </a:xfrm>
+          <a:prstGeom prst="rect">
+            <a:avLst/>
+          </a:prstGeom>
         </p:spPr>
-        <p:txBody>
-          <a:bodyPr>
-            <a:normAutofit/>
-          </a:bodyPr>
-          <a:lstStyle/>
-          <a:p>
-            <a:r>
-              <a:rPr lang="en-US" dirty="0"/>
-              <a:t>Look at recap simulation before and after demographic shift</a:t>
-            </a:r>
-          </a:p>
-          <a:p>
-            <a:pPr lvl="1"/>
-            <a:r>
-              <a:rPr lang="en-US" dirty="0"/>
-              <a:t>We expect simulation at 0 past shift to be identical</a:t>
-            </a:r>
-          </a:p>
-          <a:p>
-            <a:pPr lvl="1"/>
-            <a:r>
-              <a:rPr lang="en-US" dirty="0"/>
-              <a:t>At later times we expect there to be a contraction</a:t>
-            </a:r>
-          </a:p>
-          <a:p>
-            <a:r>
-              <a:rPr lang="en-US" dirty="0"/>
-              <a:t>Look at neutral simulations.</a:t>
-            </a:r>
-          </a:p>
-          <a:p>
-            <a:r>
-              <a:rPr lang="en-US" dirty="0"/>
-              <a:t>Look into a shift from AW to AW</a:t>
-            </a:r>
-          </a:p>
-          <a:p>
-            <a:r>
-              <a:rPr lang="en-US" dirty="0"/>
-              <a:t>Look into method for shifting the s of an existing mutation</a:t>
-            </a:r>
-          </a:p>
-          <a:p>
-            <a:pPr lvl="1"/>
-            <a:r>
-              <a:rPr lang="en-US" dirty="0"/>
-              <a:t>WIP</a:t>
-            </a:r>
-          </a:p>
-          <a:p>
-            <a:endParaRPr lang="en-US" dirty="0"/>
-          </a:p>
-        </p:txBody>
-      </p:sp>
+      </p:pic>
+      <p:pic>
+        <p:nvPicPr>
+          <p:cNvPr id="5" name="Picture 4" descr="A close up of a map&#10;&#10;Description automatically generated">
+            <a:extLst>
+              <a:ext uri="{FF2B5EF4-FFF2-40B4-BE49-F238E27FC236}">
+                <a16:creationId xmlns:a16="http://schemas.microsoft.com/office/drawing/2014/main" id="{F7F8CBE2-663F-404F-AE14-AC646B621E90}"/>
+              </a:ext>
+            </a:extLst>
+          </p:cNvPr>
+          <p:cNvPicPr>
+            <a:picLocks noChangeAspect="1"/>
+          </p:cNvPicPr>
+          <p:nvPr/>
+        </p:nvPicPr>
+        <p:blipFill>
+          <a:blip r:embed="rId3">
+            <a:extLst>
+              <a:ext uri="{28A0092B-C50C-407E-A947-70E740481C1C}">
+                <a14:useLocalDpi xmlns:a14="http://schemas.microsoft.com/office/drawing/2010/main" val="0"/>
+              </a:ext>
+            </a:extLst>
+          </a:blip>
+          <a:stretch>
+            <a:fillRect/>
+          </a:stretch>
+        </p:blipFill>
+        <p:spPr>
+          <a:xfrm>
+            <a:off x="817343" y="1343505"/>
+            <a:ext cx="4806164" cy="3386993"/>
+          </a:xfrm>
+          <a:prstGeom prst="rect">
+            <a:avLst/>
+          </a:prstGeom>
+        </p:spPr>
+      </p:pic>
     </p:spTree>
     <p:extLst>
       <p:ext uri="{BB962C8B-B14F-4D97-AF65-F5344CB8AC3E}">
-        <p14:creationId xmlns:p14="http://schemas.microsoft.com/office/powerpoint/2010/main" val="61310547"/>
+        <p14:creationId xmlns:p14="http://schemas.microsoft.com/office/powerpoint/2010/main" val="400591965"/>
       </p:ext>
     </p:extLst>
   </p:cSld>
@@ -3553,12 +3755,40 @@
           <a:chExt cx="0" cy="0"/>
         </a:xfrm>
       </p:grpSpPr>
+      <p:sp>
+        <p:nvSpPr>
+          <p:cNvPr id="2" name="Title 1">
+            <a:extLst>
+              <a:ext uri="{FF2B5EF4-FFF2-40B4-BE49-F238E27FC236}">
+                <a16:creationId xmlns:a16="http://schemas.microsoft.com/office/drawing/2014/main" id="{ED613371-D7C5-4B97-91F3-9B44F4ED1F5D}"/>
+              </a:ext>
+            </a:extLst>
+          </p:cNvPr>
+          <p:cNvSpPr>
+            <a:spLocks noGrp="1"/>
+          </p:cNvSpPr>
+          <p:nvPr>
+            <p:ph type="title"/>
+          </p:nvPr>
+        </p:nvSpPr>
+        <p:spPr/>
+        <p:txBody>
+          <a:bodyPr/>
+          <a:lstStyle/>
+          <a:p>
+            <a:r>
+              <a:rPr lang="en-US" dirty="0"/>
+              <a:t>Shifting DFE without Demographics</a:t>
+            </a:r>
+          </a:p>
+        </p:txBody>
+      </p:sp>
       <p:pic>
         <p:nvPicPr>
           <p:cNvPr id="5" name="Content Placeholder 4" descr="A close up of a map&#10;&#10;Description automatically generated">
             <a:extLst>
               <a:ext uri="{FF2B5EF4-FFF2-40B4-BE49-F238E27FC236}">
-                <a16:creationId xmlns:a16="http://schemas.microsoft.com/office/drawing/2014/main" id="{3DF7B68D-4C40-421C-8899-D1F89D4A7382}"/>
+                <a16:creationId xmlns:a16="http://schemas.microsoft.com/office/drawing/2014/main" id="{238D4451-A498-456F-95D3-F60F89BADEC9}"/>
               </a:ext>
             </a:extLst>
           </p:cNvPr>
@@ -3583,8 +3813,8 @@
         </p:blipFill>
         <p:spPr>
           <a:xfrm>
-            <a:off x="6096000" y="740390"/>
-            <a:ext cx="6174575" cy="4351338"/>
+            <a:off x="160951" y="2441643"/>
+            <a:ext cx="5664501" cy="3991879"/>
           </a:xfrm>
         </p:spPr>
       </p:pic>
@@ -3593,7 +3823,7 @@
           <p:cNvPr id="7" name="Picture 6" descr="A close up of a map&#10;&#10;Description automatically generated">
             <a:extLst>
               <a:ext uri="{FF2B5EF4-FFF2-40B4-BE49-F238E27FC236}">
-                <a16:creationId xmlns:a16="http://schemas.microsoft.com/office/drawing/2014/main" id="{96EC397D-E4CB-403D-B124-7B48F02D9785}"/>
+                <a16:creationId xmlns:a16="http://schemas.microsoft.com/office/drawing/2014/main" id="{65AB5CEE-B52B-4674-88AC-A8CC3577D38A}"/>
               </a:ext>
             </a:extLst>
           </p:cNvPr>
@@ -3616,53 +3846,18 @@
         </p:blipFill>
         <p:spPr>
           <a:xfrm>
-            <a:off x="-162798" y="740390"/>
-            <a:ext cx="6258798" cy="4410691"/>
+            <a:off x="5772251" y="2446546"/>
+            <a:ext cx="5741766" cy="4046329"/>
           </a:xfrm>
           <a:prstGeom prst="rect">
             <a:avLst/>
           </a:prstGeom>
         </p:spPr>
       </p:pic>
-      <p:sp>
-        <p:nvSpPr>
-          <p:cNvPr id="9" name="TextBox 8">
-            <a:extLst>
-              <a:ext uri="{FF2B5EF4-FFF2-40B4-BE49-F238E27FC236}">
-                <a16:creationId xmlns:a16="http://schemas.microsoft.com/office/drawing/2014/main" id="{74469767-DDB4-4FCA-96CD-A8AF4678C139}"/>
-              </a:ext>
-            </a:extLst>
-          </p:cNvPr>
-          <p:cNvSpPr txBox="1"/>
-          <p:nvPr/>
-        </p:nvSpPr>
-        <p:spPr>
-          <a:xfrm>
-            <a:off x="526211" y="5777955"/>
-            <a:ext cx="8993744" cy="369332"/>
-          </a:xfrm>
-          <a:prstGeom prst="rect">
-            <a:avLst/>
-          </a:prstGeom>
-          <a:noFill/>
-        </p:spPr>
-        <p:txBody>
-          <a:bodyPr wrap="none" rtlCol="0">
-            <a:spAutoFit/>
-          </a:bodyPr>
-          <a:lstStyle/>
-          <a:p>
-            <a:r>
-              <a:rPr lang="en-US" dirty="0"/>
-              <a:t>Keeping an Arctic Wolf DFE the whole time results in loss of SNP’s due to demographic change.</a:t>
-            </a:r>
-          </a:p>
-        </p:txBody>
-      </p:sp>
     </p:spTree>
     <p:extLst>
       <p:ext uri="{BB962C8B-B14F-4D97-AF65-F5344CB8AC3E}">
-        <p14:creationId xmlns:p14="http://schemas.microsoft.com/office/powerpoint/2010/main" val="229184422"/>
+        <p14:creationId xmlns:p14="http://schemas.microsoft.com/office/powerpoint/2010/main" val="1210759537"/>
       </p:ext>
     </p:extLst>
   </p:cSld>
@@ -3689,12 +3884,40 @@
           <a:chExt cx="0" cy="0"/>
         </a:xfrm>
       </p:grpSpPr>
+      <p:sp>
+        <p:nvSpPr>
+          <p:cNvPr id="2" name="Title 1">
+            <a:extLst>
+              <a:ext uri="{FF2B5EF4-FFF2-40B4-BE49-F238E27FC236}">
+                <a16:creationId xmlns:a16="http://schemas.microsoft.com/office/drawing/2014/main" id="{ED613371-D7C5-4B97-91F3-9B44F4ED1F5D}"/>
+              </a:ext>
+            </a:extLst>
+          </p:cNvPr>
+          <p:cNvSpPr>
+            <a:spLocks noGrp="1"/>
+          </p:cNvSpPr>
+          <p:nvPr>
+            <p:ph type="title"/>
+          </p:nvPr>
+        </p:nvSpPr>
+        <p:spPr/>
+        <p:txBody>
+          <a:bodyPr/>
+          <a:lstStyle/>
+          <a:p>
+            <a:r>
+              <a:rPr lang="en-US" dirty="0"/>
+              <a:t>Shifting DFE without Demographics</a:t>
+            </a:r>
+          </a:p>
+        </p:txBody>
+      </p:sp>
       <p:pic>
         <p:nvPicPr>
           <p:cNvPr id="5" name="Picture 4" descr="A close up of a map&#10;&#10;Description automatically generated">
             <a:extLst>
               <a:ext uri="{FF2B5EF4-FFF2-40B4-BE49-F238E27FC236}">
-                <a16:creationId xmlns:a16="http://schemas.microsoft.com/office/drawing/2014/main" id="{1C0C4133-C925-46A5-87F1-181C2BC0E816}"/>
+                <a16:creationId xmlns:a16="http://schemas.microsoft.com/office/drawing/2014/main" id="{5F863C6D-23A7-4878-A769-F13A6920FFD7}"/>
               </a:ext>
             </a:extLst>
           </p:cNvPr>
@@ -3703,7 +3926,7 @@
           </p:cNvPicPr>
           <p:nvPr/>
         </p:nvPicPr>
-        <p:blipFill rotWithShape="1">
+        <p:blipFill>
           <a:blip r:embed="rId2">
             <a:extLst>
               <a:ext uri="{28A0092B-C50C-407E-A947-70E740481C1C}">
@@ -3711,13 +3934,14 @@
               </a:ext>
             </a:extLst>
           </a:blip>
-          <a:srcRect r="18552"/>
-          <a:stretch/>
+          <a:stretch>
+            <a:fillRect/>
+          </a:stretch>
         </p:blipFill>
         <p:spPr>
           <a:xfrm>
-            <a:off x="6744908" y="653550"/>
-            <a:ext cx="5097629" cy="4410691"/>
+            <a:off x="331247" y="1893611"/>
+            <a:ext cx="5706051" cy="4021160"/>
           </a:xfrm>
           <a:prstGeom prst="rect">
             <a:avLst/>
@@ -3729,7 +3953,7 @@
           <p:cNvPr id="7" name="Picture 6" descr="A close up of a map&#10;&#10;Description automatically generated">
             <a:extLst>
               <a:ext uri="{FF2B5EF4-FFF2-40B4-BE49-F238E27FC236}">
-                <a16:creationId xmlns:a16="http://schemas.microsoft.com/office/drawing/2014/main" id="{BF252069-F635-40E4-8C86-439E167109B7}"/>
+                <a16:creationId xmlns:a16="http://schemas.microsoft.com/office/drawing/2014/main" id="{9755915E-E24F-4A9D-BD09-1FCFA879E4E8}"/>
               </a:ext>
             </a:extLst>
           </p:cNvPr>
@@ -3752,53 +3976,18 @@
         </p:blipFill>
         <p:spPr>
           <a:xfrm>
-            <a:off x="349463" y="452429"/>
-            <a:ext cx="6258798" cy="4410691"/>
+            <a:off x="6037298" y="1893611"/>
+            <a:ext cx="5706051" cy="4021160"/>
           </a:xfrm>
           <a:prstGeom prst="rect">
             <a:avLst/>
           </a:prstGeom>
         </p:spPr>
       </p:pic>
-      <p:sp>
-        <p:nvSpPr>
-          <p:cNvPr id="12" name="TextBox 11">
-            <a:extLst>
-              <a:ext uri="{FF2B5EF4-FFF2-40B4-BE49-F238E27FC236}">
-                <a16:creationId xmlns:a16="http://schemas.microsoft.com/office/drawing/2014/main" id="{403A0180-2FB9-4BFD-BA93-98D9CE902412}"/>
-              </a:ext>
-            </a:extLst>
-          </p:cNvPr>
-          <p:cNvSpPr txBox="1"/>
-          <p:nvPr/>
-        </p:nvSpPr>
-        <p:spPr>
-          <a:xfrm>
-            <a:off x="448573" y="5581290"/>
-            <a:ext cx="7598490" cy="369332"/>
-          </a:xfrm>
-          <a:prstGeom prst="rect">
-            <a:avLst/>
-          </a:prstGeom>
-          <a:noFill/>
-        </p:spPr>
-        <p:txBody>
-          <a:bodyPr wrap="none" rtlCol="0">
-            <a:spAutoFit/>
-          </a:bodyPr>
-          <a:lstStyle/>
-          <a:p>
-            <a:r>
-              <a:rPr lang="en-US" dirty="0"/>
-              <a:t>Shifting from Arctic wolves to a truly neutral DFE results in massive loss of SNPs</a:t>
-            </a:r>
-          </a:p>
-        </p:txBody>
-      </p:sp>
     </p:spTree>
     <p:extLst>
       <p:ext uri="{BB962C8B-B14F-4D97-AF65-F5344CB8AC3E}">
-        <p14:creationId xmlns:p14="http://schemas.microsoft.com/office/powerpoint/2010/main" val="600205473"/>
+        <p14:creationId xmlns:p14="http://schemas.microsoft.com/office/powerpoint/2010/main" val="2027252443"/>
       </p:ext>
     </p:extLst>
   </p:cSld>
@@ -3830,7 +4019,7 @@
           <p:cNvPr id="2" name="Title 1">
             <a:extLst>
               <a:ext uri="{FF2B5EF4-FFF2-40B4-BE49-F238E27FC236}">
-                <a16:creationId xmlns:a16="http://schemas.microsoft.com/office/drawing/2014/main" id="{87379C76-6864-445A-A10F-B6635B90A471}"/>
+                <a16:creationId xmlns:a16="http://schemas.microsoft.com/office/drawing/2014/main" id="{1F925E1F-FB8A-447F-B9EF-2BF0418B5F35}"/>
               </a:ext>
             </a:extLst>
           </p:cNvPr>
@@ -3848,78 +4037,87 @@
           <a:p>
             <a:r>
               <a:rPr lang="en-US" dirty="0"/>
-              <a:t>“Recap” Simulation summary</a:t>
-            </a:r>
-          </a:p>
-        </p:txBody>
-      </p:sp>
-      <p:sp>
-        <p:nvSpPr>
-          <p:cNvPr id="3" name="Content Placeholder 2">
-            <a:extLst>
-              <a:ext uri="{FF2B5EF4-FFF2-40B4-BE49-F238E27FC236}">
-                <a16:creationId xmlns:a16="http://schemas.microsoft.com/office/drawing/2014/main" id="{2191A75C-82C6-47EC-9CC3-C717E9479B8A}"/>
-              </a:ext>
-            </a:extLst>
-          </p:cNvPr>
-          <p:cNvSpPr>
-            <a:spLocks noGrp="1"/>
-          </p:cNvSpPr>
-          <p:nvPr>
-            <p:ph idx="1"/>
-          </p:nvPr>
-        </p:nvSpPr>
-        <p:spPr/>
-        <p:txBody>
-          <a:bodyPr>
-            <a:normAutofit/>
-          </a:bodyPr>
-          <a:lstStyle/>
-          <a:p>
-            <a:pPr marL="0" indent="0">
-              <a:buNone/>
-            </a:pPr>
-            <a:r>
-              <a:rPr lang="en-US" dirty="0"/>
-              <a:t>As a reminder, the simulations were performed as follows:</a:t>
-            </a:r>
-          </a:p>
-          <a:p>
-            <a:r>
-              <a:rPr lang="en-US" dirty="0"/>
-              <a:t>An ancestral population of 80,000 wolves existed some time in the past.</a:t>
-            </a:r>
-          </a:p>
-          <a:p>
-            <a:r>
-              <a:rPr lang="en-US" dirty="0"/>
-              <a:t>Their evolution was “burnt in” for 80,000 * 10 generations, i.e., 800,000 generations.</a:t>
-            </a:r>
-          </a:p>
-          <a:p>
-            <a:r>
-              <a:rPr lang="en-US" dirty="0"/>
-              <a:t>24,251 generations ago, the ancestral population was subject to a bottleneck to 19,000 individuals, i.e., a Labrador demography.</a:t>
-            </a:r>
-          </a:p>
-          <a:p>
-            <a:r>
-              <a:rPr lang="en-US" dirty="0"/>
-              <a:t>At this time, the DFE was set to match that of ancestral Arctic Wolves</a:t>
-            </a:r>
-          </a:p>
-          <a:p>
-            <a:r>
-              <a:rPr lang="en-US" dirty="0"/>
-              <a:t>Today, we sample 8 individuals, or 16 chromosomes.</a:t>
-            </a:r>
-          </a:p>
-        </p:txBody>
-      </p:sp>
+              <a:t>Shifting DFE without Demographics</a:t>
+            </a:r>
+          </a:p>
+        </p:txBody>
+      </p:sp>
+      <p:pic>
+        <p:nvPicPr>
+          <p:cNvPr id="5" name="Picture 4" descr="A close up of a map&#10;&#10;Description automatically generated">
+            <a:extLst>
+              <a:ext uri="{FF2B5EF4-FFF2-40B4-BE49-F238E27FC236}">
+                <a16:creationId xmlns:a16="http://schemas.microsoft.com/office/drawing/2014/main" id="{F7705650-0B81-46BA-9BDD-5C62670BEF90}"/>
+              </a:ext>
+            </a:extLst>
+          </p:cNvPr>
+          <p:cNvPicPr>
+            <a:picLocks noChangeAspect="1"/>
+          </p:cNvPicPr>
+          <p:nvPr/>
+        </p:nvPicPr>
+        <p:blipFill>
+          <a:blip r:embed="rId2">
+            <a:extLst>
+              <a:ext uri="{28A0092B-C50C-407E-A947-70E740481C1C}">
+                <a14:useLocalDpi xmlns:a14="http://schemas.microsoft.com/office/drawing/2010/main" val="0"/>
+              </a:ext>
+            </a:extLst>
+          </a:blip>
+          <a:stretch>
+            <a:fillRect/>
+          </a:stretch>
+        </p:blipFill>
+        <p:spPr>
+          <a:xfrm>
+            <a:off x="246832" y="1690688"/>
+            <a:ext cx="5593342" cy="3941732"/>
+          </a:xfrm>
+          <a:prstGeom prst="rect">
+            <a:avLst/>
+          </a:prstGeom>
+        </p:spPr>
+      </p:pic>
+      <p:pic>
+        <p:nvPicPr>
+          <p:cNvPr id="7" name="Picture 6" descr="A close up of a map&#10;&#10;Description automatically generated">
+            <a:extLst>
+              <a:ext uri="{FF2B5EF4-FFF2-40B4-BE49-F238E27FC236}">
+                <a16:creationId xmlns:a16="http://schemas.microsoft.com/office/drawing/2014/main" id="{C7122FCE-783F-43EB-8D0F-8C3B3CFEF5A5}"/>
+              </a:ext>
+            </a:extLst>
+          </p:cNvPr>
+          <p:cNvPicPr>
+            <a:picLocks noChangeAspect="1"/>
+          </p:cNvPicPr>
+          <p:nvPr/>
+        </p:nvPicPr>
+        <p:blipFill>
+          <a:blip r:embed="rId3">
+            <a:extLst>
+              <a:ext uri="{28A0092B-C50C-407E-A947-70E740481C1C}">
+                <a14:useLocalDpi xmlns:a14="http://schemas.microsoft.com/office/drawing/2010/main" val="0"/>
+              </a:ext>
+            </a:extLst>
+          </a:blip>
+          <a:stretch>
+            <a:fillRect/>
+          </a:stretch>
+        </p:blipFill>
+        <p:spPr>
+          <a:xfrm>
+            <a:off x="5883232" y="1690688"/>
+            <a:ext cx="5593342" cy="3941732"/>
+          </a:xfrm>
+          <a:prstGeom prst="rect">
+            <a:avLst/>
+          </a:prstGeom>
+        </p:spPr>
+      </p:pic>
     </p:spTree>
     <p:extLst>
       <p:ext uri="{BB962C8B-B14F-4D97-AF65-F5344CB8AC3E}">
-        <p14:creationId xmlns:p14="http://schemas.microsoft.com/office/powerpoint/2010/main" val="1037327214"/>
+        <p14:creationId xmlns:p14="http://schemas.microsoft.com/office/powerpoint/2010/main" val="1301336536"/>
       </p:ext>
     </p:extLst>
   </p:cSld>
@@ -3946,6 +4144,375 @@
           <a:chExt cx="0" cy="0"/>
         </a:xfrm>
       </p:grpSpPr>
+      <p:pic>
+        <p:nvPicPr>
+          <p:cNvPr id="5" name="Content Placeholder 4" descr="A close up of a map&#10;&#10;Description automatically generated">
+            <a:extLst>
+              <a:ext uri="{FF2B5EF4-FFF2-40B4-BE49-F238E27FC236}">
+                <a16:creationId xmlns:a16="http://schemas.microsoft.com/office/drawing/2014/main" id="{82A39048-8031-4EF2-A286-F1A6CA2D3416}"/>
+              </a:ext>
+            </a:extLst>
+          </p:cNvPr>
+          <p:cNvPicPr>
+            <a:picLocks noGrp="1" noChangeAspect="1"/>
+          </p:cNvPicPr>
+          <p:nvPr>
+            <p:ph idx="1"/>
+          </p:nvPr>
+        </p:nvPicPr>
+        <p:blipFill>
+          <a:blip r:embed="rId2">
+            <a:extLst>
+              <a:ext uri="{28A0092B-C50C-407E-A947-70E740481C1C}">
+                <a14:useLocalDpi xmlns:a14="http://schemas.microsoft.com/office/drawing/2010/main" val="0"/>
+              </a:ext>
+            </a:extLst>
+          </a:blip>
+          <a:stretch>
+            <a:fillRect/>
+          </a:stretch>
+        </p:blipFill>
+        <p:spPr>
+          <a:xfrm>
+            <a:off x="217909" y="243784"/>
+            <a:ext cx="4519840" cy="3185216"/>
+          </a:xfrm>
+        </p:spPr>
+      </p:pic>
+      <p:pic>
+        <p:nvPicPr>
+          <p:cNvPr id="7" name="Picture 6" descr="A close up of a map&#10;&#10;Description automatically generated">
+            <a:extLst>
+              <a:ext uri="{FF2B5EF4-FFF2-40B4-BE49-F238E27FC236}">
+                <a16:creationId xmlns:a16="http://schemas.microsoft.com/office/drawing/2014/main" id="{1E744F52-2426-4E2B-A4BC-932E46DEC451}"/>
+              </a:ext>
+            </a:extLst>
+          </p:cNvPr>
+          <p:cNvPicPr>
+            <a:picLocks noChangeAspect="1"/>
+          </p:cNvPicPr>
+          <p:nvPr/>
+        </p:nvPicPr>
+        <p:blipFill>
+          <a:blip r:embed="rId3">
+            <a:extLst>
+              <a:ext uri="{28A0092B-C50C-407E-A947-70E740481C1C}">
+                <a14:useLocalDpi xmlns:a14="http://schemas.microsoft.com/office/drawing/2010/main" val="0"/>
+              </a:ext>
+            </a:extLst>
+          </a:blip>
+          <a:stretch>
+            <a:fillRect/>
+          </a:stretch>
+        </p:blipFill>
+        <p:spPr>
+          <a:xfrm>
+            <a:off x="3573863" y="3429000"/>
+            <a:ext cx="4581492" cy="3228662"/>
+          </a:xfrm>
+          <a:prstGeom prst="rect">
+            <a:avLst/>
+          </a:prstGeom>
+        </p:spPr>
+      </p:pic>
+      <p:pic>
+        <p:nvPicPr>
+          <p:cNvPr id="8" name="Content Placeholder 4" descr="A close up of a map&#10;&#10;Description automatically generated">
+            <a:extLst>
+              <a:ext uri="{FF2B5EF4-FFF2-40B4-BE49-F238E27FC236}">
+                <a16:creationId xmlns:a16="http://schemas.microsoft.com/office/drawing/2014/main" id="{009C6552-C46C-46E5-AA81-E0EDE47F706C}"/>
+              </a:ext>
+            </a:extLst>
+          </p:cNvPr>
+          <p:cNvPicPr>
+            <a:picLocks noChangeAspect="1"/>
+          </p:cNvPicPr>
+          <p:nvPr/>
+        </p:nvPicPr>
+        <p:blipFill>
+          <a:blip r:embed="rId4">
+            <a:extLst>
+              <a:ext uri="{28A0092B-C50C-407E-A947-70E740481C1C}">
+                <a14:useLocalDpi xmlns:a14="http://schemas.microsoft.com/office/drawing/2010/main" val="0"/>
+              </a:ext>
+            </a:extLst>
+          </a:blip>
+          <a:stretch>
+            <a:fillRect/>
+          </a:stretch>
+        </p:blipFill>
+        <p:spPr>
+          <a:xfrm>
+            <a:off x="7159557" y="243784"/>
+            <a:ext cx="4519841" cy="3185216"/>
+          </a:xfrm>
+          <a:prstGeom prst="rect">
+            <a:avLst/>
+          </a:prstGeom>
+        </p:spPr>
+      </p:pic>
+      <p:sp>
+        <p:nvSpPr>
+          <p:cNvPr id="9" name="TextBox 8">
+            <a:extLst>
+              <a:ext uri="{FF2B5EF4-FFF2-40B4-BE49-F238E27FC236}">
+                <a16:creationId xmlns:a16="http://schemas.microsoft.com/office/drawing/2014/main" id="{A36C14C9-5716-4EB9-8216-9036856742FC}"/>
+              </a:ext>
+            </a:extLst>
+          </p:cNvPr>
+          <p:cNvSpPr txBox="1"/>
+          <p:nvPr/>
+        </p:nvSpPr>
+        <p:spPr>
+          <a:xfrm>
+            <a:off x="8565232" y="3550595"/>
+            <a:ext cx="2704289" cy="923330"/>
+          </a:xfrm>
+          <a:prstGeom prst="rect">
+            <a:avLst/>
+          </a:prstGeom>
+          <a:noFill/>
+        </p:spPr>
+        <p:txBody>
+          <a:bodyPr wrap="square" rtlCol="0">
+            <a:spAutoFit/>
+          </a:bodyPr>
+          <a:lstStyle/>
+          <a:p>
+            <a:r>
+              <a:rPr lang="en-US" dirty="0"/>
+              <a:t>Demographic contraction results in reduction of singletons</a:t>
+            </a:r>
+          </a:p>
+        </p:txBody>
+      </p:sp>
+      <p:sp>
+        <p:nvSpPr>
+          <p:cNvPr id="11" name="TextBox 10">
+            <a:extLst>
+              <a:ext uri="{FF2B5EF4-FFF2-40B4-BE49-F238E27FC236}">
+                <a16:creationId xmlns:a16="http://schemas.microsoft.com/office/drawing/2014/main" id="{948F8825-2516-4183-876B-6983487AB732}"/>
+              </a:ext>
+            </a:extLst>
+          </p:cNvPr>
+          <p:cNvSpPr txBox="1"/>
+          <p:nvPr/>
+        </p:nvSpPr>
+        <p:spPr>
+          <a:xfrm>
+            <a:off x="543742" y="3557337"/>
+            <a:ext cx="2704289" cy="923330"/>
+          </a:xfrm>
+          <a:prstGeom prst="rect">
+            <a:avLst/>
+          </a:prstGeom>
+          <a:noFill/>
+        </p:spPr>
+        <p:txBody>
+          <a:bodyPr wrap="square" rtlCol="0">
+            <a:spAutoFit/>
+          </a:bodyPr>
+          <a:lstStyle/>
+          <a:p>
+            <a:r>
+              <a:rPr lang="en-US" dirty="0"/>
+              <a:t>Shift of DFE to truly neutral results in more singletons</a:t>
+            </a:r>
+          </a:p>
+        </p:txBody>
+      </p:sp>
+      <p:sp>
+        <p:nvSpPr>
+          <p:cNvPr id="12" name="TextBox 11">
+            <a:extLst>
+              <a:ext uri="{FF2B5EF4-FFF2-40B4-BE49-F238E27FC236}">
+                <a16:creationId xmlns:a16="http://schemas.microsoft.com/office/drawing/2014/main" id="{A9221C09-FE54-4724-840D-02E8066EB4E6}"/>
+              </a:ext>
+            </a:extLst>
+          </p:cNvPr>
+          <p:cNvSpPr txBox="1"/>
+          <p:nvPr/>
+        </p:nvSpPr>
+        <p:spPr>
+          <a:xfrm>
+            <a:off x="8760029" y="5217952"/>
+            <a:ext cx="2919369" cy="1200329"/>
+          </a:xfrm>
+          <a:prstGeom prst="rect">
+            <a:avLst/>
+          </a:prstGeom>
+          <a:noFill/>
+        </p:spPr>
+        <p:txBody>
+          <a:bodyPr wrap="square" rtlCol="0">
+            <a:spAutoFit/>
+          </a:bodyPr>
+          <a:lstStyle/>
+          <a:p>
+            <a:r>
+              <a:rPr lang="en-US" dirty="0"/>
+              <a:t>Demographic contraction and shift to DFE,</a:t>
+            </a:r>
+          </a:p>
+          <a:p>
+            <a:r>
+              <a:rPr lang="en-US" dirty="0"/>
+              <a:t>Contraction dominates shape of SFS.</a:t>
+            </a:r>
+          </a:p>
+        </p:txBody>
+      </p:sp>
+    </p:spTree>
+    <p:extLst>
+      <p:ext uri="{BB962C8B-B14F-4D97-AF65-F5344CB8AC3E}">
+        <p14:creationId xmlns:p14="http://schemas.microsoft.com/office/powerpoint/2010/main" val="1973107937"/>
+      </p:ext>
+    </p:extLst>
+  </p:cSld>
+  <p:clrMapOvr>
+    <a:masterClrMapping/>
+  </p:clrMapOvr>
+</p:sld>
+</file>
+
+<file path=ppt/slides/slide7.xml><?xml version="1.0" encoding="utf-8"?>
+<p:sld xmlns:a="http://schemas.openxmlformats.org/drawingml/2006/main" xmlns:r="http://schemas.openxmlformats.org/officeDocument/2006/relationships" xmlns:p="http://schemas.openxmlformats.org/presentationml/2006/main">
+  <p:cSld>
+    <p:spTree>
+      <p:nvGrpSpPr>
+        <p:cNvPr id="1" name=""/>
+        <p:cNvGrpSpPr/>
+        <p:nvPr/>
+      </p:nvGrpSpPr>
+      <p:grpSpPr>
+        <a:xfrm>
+          <a:off x="0" y="0"/>
+          <a:ext cx="0" cy="0"/>
+          <a:chOff x="0" y="0"/>
+          <a:chExt cx="0" cy="0"/>
+        </a:xfrm>
+      </p:grpSpPr>
+      <p:sp>
+        <p:nvSpPr>
+          <p:cNvPr id="2" name="Title 1">
+            <a:extLst>
+              <a:ext uri="{FF2B5EF4-FFF2-40B4-BE49-F238E27FC236}">
+                <a16:creationId xmlns:a16="http://schemas.microsoft.com/office/drawing/2014/main" id="{87379C76-6864-445A-A10F-B6635B90A471}"/>
+              </a:ext>
+            </a:extLst>
+          </p:cNvPr>
+          <p:cNvSpPr>
+            <a:spLocks noGrp="1"/>
+          </p:cNvSpPr>
+          <p:nvPr>
+            <p:ph type="title"/>
+          </p:nvPr>
+        </p:nvSpPr>
+        <p:spPr/>
+        <p:txBody>
+          <a:bodyPr/>
+          <a:lstStyle/>
+          <a:p>
+            <a:r>
+              <a:rPr lang="en-US" dirty="0"/>
+              <a:t>“Recap” Simulation summary</a:t>
+            </a:r>
+          </a:p>
+        </p:txBody>
+      </p:sp>
+      <p:sp>
+        <p:nvSpPr>
+          <p:cNvPr id="3" name="Content Placeholder 2">
+            <a:extLst>
+              <a:ext uri="{FF2B5EF4-FFF2-40B4-BE49-F238E27FC236}">
+                <a16:creationId xmlns:a16="http://schemas.microsoft.com/office/drawing/2014/main" id="{2191A75C-82C6-47EC-9CC3-C717E9479B8A}"/>
+              </a:ext>
+            </a:extLst>
+          </p:cNvPr>
+          <p:cNvSpPr>
+            <a:spLocks noGrp="1"/>
+          </p:cNvSpPr>
+          <p:nvPr>
+            <p:ph idx="1"/>
+          </p:nvPr>
+        </p:nvSpPr>
+        <p:spPr/>
+        <p:txBody>
+          <a:bodyPr>
+            <a:normAutofit/>
+          </a:bodyPr>
+          <a:lstStyle/>
+          <a:p>
+            <a:pPr marL="0" indent="0">
+              <a:buNone/>
+            </a:pPr>
+            <a:r>
+              <a:rPr lang="en-US" dirty="0"/>
+              <a:t>As a reminder, the simulations were performed as follows:</a:t>
+            </a:r>
+          </a:p>
+          <a:p>
+            <a:r>
+              <a:rPr lang="en-US" dirty="0"/>
+              <a:t>An ancestral population of 80,000 wolves existed some time in the past.</a:t>
+            </a:r>
+          </a:p>
+          <a:p>
+            <a:r>
+              <a:rPr lang="en-US" dirty="0"/>
+              <a:t>Their evolution was “burnt in” for 80,000 * 10 generations, i.e., 800,000 generations.</a:t>
+            </a:r>
+          </a:p>
+          <a:p>
+            <a:r>
+              <a:rPr lang="en-US" dirty="0"/>
+              <a:t>24,251 generations ago, the ancestral population was subject to a bottleneck to 19,000 individuals, i.e., a Labrador demography.</a:t>
+            </a:r>
+          </a:p>
+          <a:p>
+            <a:r>
+              <a:rPr lang="en-US" dirty="0"/>
+              <a:t>At this time, the DFE was set to match that of ancestral Arctic Wolves</a:t>
+            </a:r>
+          </a:p>
+          <a:p>
+            <a:r>
+              <a:rPr lang="en-US" dirty="0"/>
+              <a:t>Today, we sample 8 individuals, or 16 chromosomes.</a:t>
+            </a:r>
+          </a:p>
+        </p:txBody>
+      </p:sp>
+    </p:spTree>
+    <p:extLst>
+      <p:ext uri="{BB962C8B-B14F-4D97-AF65-F5344CB8AC3E}">
+        <p14:creationId xmlns:p14="http://schemas.microsoft.com/office/powerpoint/2010/main" val="1037327214"/>
+      </p:ext>
+    </p:extLst>
+  </p:cSld>
+  <p:clrMapOvr>
+    <a:masterClrMapping/>
+  </p:clrMapOvr>
+</p:sld>
+</file>
+
+<file path=ppt/slides/slide8.xml><?xml version="1.0" encoding="utf-8"?>
+<p:sld xmlns:a="http://schemas.openxmlformats.org/drawingml/2006/main" xmlns:r="http://schemas.openxmlformats.org/officeDocument/2006/relationships" xmlns:p="http://schemas.openxmlformats.org/presentationml/2006/main">
+  <p:cSld>
+    <p:spTree>
+      <p:nvGrpSpPr>
+        <p:cNvPr id="1" name=""/>
+        <p:cNvGrpSpPr/>
+        <p:nvPr/>
+      </p:nvGrpSpPr>
+      <p:grpSpPr>
+        <a:xfrm>
+          <a:off x="0" y="0"/>
+          <a:ext cx="0" cy="0"/>
+          <a:chOff x="0" y="0"/>
+          <a:chExt cx="0" cy="0"/>
+        </a:xfrm>
+      </p:grpSpPr>
       <p:sp>
         <p:nvSpPr>
           <p:cNvPr id="2" name="Title 1">
@@ -4050,7 +4617,7 @@
 </p:sld>
 </file>
 
-<file path=ppt/slides/slide7.xml><?xml version="1.0" encoding="utf-8"?>
+<file path=ppt/slides/slide9.xml><?xml version="1.0" encoding="utf-8"?>
 <p:sld xmlns:a="http://schemas.openxmlformats.org/drawingml/2006/main" xmlns:r="http://schemas.openxmlformats.org/officeDocument/2006/relationships" xmlns:p="http://schemas.openxmlformats.org/presentationml/2006/main">
   <p:cSld>
     <p:spTree>

</xml_diff>